<commit_message>
added gym sports case to en and fr pages, in pdf and pptx
</commit_message>
<xml_diff>
--- a/docs/ppt/en/method/DATOM-Method-all-canvas-EN.pptx
+++ b/docs/ppt/en/method/DATOM-Method-all-canvas-EN.pptx
@@ -20894,8 +20894,8 @@
         </p:nvSpPr>
         <p:spPr>
           <a:xfrm>
-            <a:off x="1522125" y="507206"/>
-            <a:ext cx="6147300" cy="4323300"/>
+            <a:off x="1522125" y="583400"/>
+            <a:ext cx="6147300" cy="4307100"/>
           </a:xfrm>
           <a:prstGeom prst="rect">
             <a:avLst/>
@@ -21091,8 +21091,8 @@
         </p:nvCxnSpPr>
         <p:spPr>
           <a:xfrm>
-            <a:off x="2792625" y="1217138"/>
-            <a:ext cx="3373500" cy="3002700"/>
+            <a:off x="2964475" y="1351325"/>
+            <a:ext cx="3201600" cy="2868600"/>
           </a:xfrm>
           <a:prstGeom prst="straightConnector1">
             <a:avLst/>
@@ -21143,8 +21143,8 @@
         </p:nvSpPr>
         <p:spPr>
           <a:xfrm>
-            <a:off x="1746937" y="563775"/>
-            <a:ext cx="1779300" cy="309600"/>
+            <a:off x="1746924" y="563775"/>
+            <a:ext cx="1952400" cy="394800"/>
           </a:xfrm>
           <a:prstGeom prst="rect">
             <a:avLst/>
@@ -22842,7 +22842,7 @@
             <a:tbl>
               <a:tblPr>
                 <a:noFill/>
-                <a:tableStyleId>{ED616B15-95E1-4954-9011-6A7DC331E654}</a:tableStyleId>
+                <a:tableStyleId>{BFA29A32-B0D0-49FA-B40B-847DCE5264A0}</a:tableStyleId>
               </a:tblPr>
               <a:tblGrid>
                 <a:gridCol w="1575950"/>
@@ -22896,7 +22896,44 @@
                       </a:endParaRPr>
                     </a:p>
                   </a:txBody>
-                  <a:tcPr marT="0" marB="0" marR="34300" marL="34300"/>
+                  <a:tcPr marT="0" marB="0" marR="34300" marL="34300">
+                    <a:lnL cap="flat" cmpd="sng" w="9525">
+                      <a:solidFill>
+                        <a:srgbClr val="000000"/>
+                      </a:solidFill>
+                      <a:prstDash val="solid"/>
+                      <a:round/>
+                      <a:headEnd len="sm" w="sm" type="none"/>
+                      <a:tailEnd len="sm" w="sm" type="none"/>
+                    </a:lnL>
+                    <a:lnR cap="flat" cmpd="sng" w="9525">
+                      <a:solidFill>
+                        <a:srgbClr val="000000"/>
+                      </a:solidFill>
+                      <a:prstDash val="solid"/>
+                      <a:round/>
+                      <a:headEnd len="sm" w="sm" type="none"/>
+                      <a:tailEnd len="sm" w="sm" type="none"/>
+                    </a:lnR>
+                    <a:lnT cap="flat" cmpd="sng" w="9525">
+                      <a:solidFill>
+                        <a:srgbClr val="000000"/>
+                      </a:solidFill>
+                      <a:prstDash val="solid"/>
+                      <a:round/>
+                      <a:headEnd len="sm" w="sm" type="none"/>
+                      <a:tailEnd len="sm" w="sm" type="none"/>
+                    </a:lnT>
+                    <a:lnB cap="flat" cmpd="sng" w="9525">
+                      <a:solidFill>
+                        <a:srgbClr val="000000"/>
+                      </a:solidFill>
+                      <a:prstDash val="solid"/>
+                      <a:round/>
+                      <a:headEnd len="sm" w="sm" type="none"/>
+                      <a:tailEnd len="sm" w="sm" type="none"/>
+                    </a:lnB>
+                  </a:tcPr>
                 </a:tc>
                 <a:tc hMerge="1"/>
               </a:tr>
@@ -22949,6 +22986,42 @@
                     </a:p>
                   </a:txBody>
                   <a:tcPr marT="0" marB="0" marR="34300" marL="34300">
+                    <a:lnL cap="flat" cmpd="sng" w="9525">
+                      <a:solidFill>
+                        <a:srgbClr val="000000"/>
+                      </a:solidFill>
+                      <a:prstDash val="solid"/>
+                      <a:round/>
+                      <a:headEnd len="sm" w="sm" type="none"/>
+                      <a:tailEnd len="sm" w="sm" type="none"/>
+                    </a:lnL>
+                    <a:lnR cap="flat" cmpd="sng" w="9525">
+                      <a:solidFill>
+                        <a:srgbClr val="000000"/>
+                      </a:solidFill>
+                      <a:prstDash val="solid"/>
+                      <a:round/>
+                      <a:headEnd len="sm" w="sm" type="none"/>
+                      <a:tailEnd len="sm" w="sm" type="none"/>
+                    </a:lnR>
+                    <a:lnT cap="flat" cmpd="sng" w="9525">
+                      <a:solidFill>
+                        <a:srgbClr val="000000"/>
+                      </a:solidFill>
+                      <a:prstDash val="solid"/>
+                      <a:round/>
+                      <a:headEnd len="sm" w="sm" type="none"/>
+                      <a:tailEnd len="sm" w="sm" type="none"/>
+                    </a:lnT>
+                    <a:lnB cap="flat" cmpd="sng" w="9525">
+                      <a:solidFill>
+                        <a:srgbClr val="000000"/>
+                      </a:solidFill>
+                      <a:prstDash val="solid"/>
+                      <a:round/>
+                      <a:headEnd len="sm" w="sm" type="none"/>
+                      <a:tailEnd len="sm" w="sm" type="none"/>
+                    </a:lnB>
                     <a:solidFill>
                       <a:srgbClr val="000000"/>
                     </a:solidFill>
@@ -23002,6 +23075,42 @@
                     </a:p>
                   </a:txBody>
                   <a:tcPr marT="0" marB="0" marR="34300" marL="34300">
+                    <a:lnL cap="flat" cmpd="sng" w="9525">
+                      <a:solidFill>
+                        <a:srgbClr val="000000"/>
+                      </a:solidFill>
+                      <a:prstDash val="solid"/>
+                      <a:round/>
+                      <a:headEnd len="sm" w="sm" type="none"/>
+                      <a:tailEnd len="sm" w="sm" type="none"/>
+                    </a:lnL>
+                    <a:lnR cap="flat" cmpd="sng" w="9525">
+                      <a:solidFill>
+                        <a:srgbClr val="000000"/>
+                      </a:solidFill>
+                      <a:prstDash val="solid"/>
+                      <a:round/>
+                      <a:headEnd len="sm" w="sm" type="none"/>
+                      <a:tailEnd len="sm" w="sm" type="none"/>
+                    </a:lnR>
+                    <a:lnT cap="flat" cmpd="sng" w="9525">
+                      <a:solidFill>
+                        <a:srgbClr val="000000"/>
+                      </a:solidFill>
+                      <a:prstDash val="solid"/>
+                      <a:round/>
+                      <a:headEnd len="sm" w="sm" type="none"/>
+                      <a:tailEnd len="sm" w="sm" type="none"/>
+                    </a:lnT>
+                    <a:lnB cap="flat" cmpd="sng" w="9525">
+                      <a:solidFill>
+                        <a:srgbClr val="000000"/>
+                      </a:solidFill>
+                      <a:prstDash val="solid"/>
+                      <a:round/>
+                      <a:headEnd len="sm" w="sm" type="none"/>
+                      <a:tailEnd len="sm" w="sm" type="none"/>
+                    </a:lnB>
                     <a:solidFill>
                       <a:srgbClr val="000000"/>
                     </a:solidFill>
@@ -23048,6 +23157,42 @@
                     </a:p>
                   </a:txBody>
                   <a:tcPr marT="0" marB="0" marR="34300" marL="34300">
+                    <a:lnL cap="flat" cmpd="sng" w="9525">
+                      <a:solidFill>
+                        <a:srgbClr val="000000"/>
+                      </a:solidFill>
+                      <a:prstDash val="solid"/>
+                      <a:round/>
+                      <a:headEnd len="sm" w="sm" type="none"/>
+                      <a:tailEnd len="sm" w="sm" type="none"/>
+                    </a:lnL>
+                    <a:lnR cap="flat" cmpd="sng" w="9525">
+                      <a:solidFill>
+                        <a:srgbClr val="000000"/>
+                      </a:solidFill>
+                      <a:prstDash val="solid"/>
+                      <a:round/>
+                      <a:headEnd len="sm" w="sm" type="none"/>
+                      <a:tailEnd len="sm" w="sm" type="none"/>
+                    </a:lnR>
+                    <a:lnT cap="flat" cmpd="sng" w="9525">
+                      <a:solidFill>
+                        <a:srgbClr val="000000"/>
+                      </a:solidFill>
+                      <a:prstDash val="solid"/>
+                      <a:round/>
+                      <a:headEnd len="sm" w="sm" type="none"/>
+                      <a:tailEnd len="sm" w="sm" type="none"/>
+                    </a:lnT>
+                    <a:lnB cap="flat" cmpd="sng" w="9525">
+                      <a:solidFill>
+                        <a:srgbClr val="000000"/>
+                      </a:solidFill>
+                      <a:prstDash val="solid"/>
+                      <a:round/>
+                      <a:headEnd len="sm" w="sm" type="none"/>
+                      <a:tailEnd len="sm" w="sm" type="none"/>
+                    </a:lnB>
                     <a:solidFill>
                       <a:srgbClr val="FFFFFF"/>
                     </a:solidFill>
@@ -23088,7 +23233,44 @@
                       </a:endParaRPr>
                     </a:p>
                   </a:txBody>
-                  <a:tcPr marT="0" marB="0" marR="34300" marL="34300"/>
+                  <a:tcPr marT="0" marB="0" marR="34300" marL="34300">
+                    <a:lnL cap="flat" cmpd="sng" w="9525">
+                      <a:solidFill>
+                        <a:srgbClr val="000000"/>
+                      </a:solidFill>
+                      <a:prstDash val="solid"/>
+                      <a:round/>
+                      <a:headEnd len="sm" w="sm" type="none"/>
+                      <a:tailEnd len="sm" w="sm" type="none"/>
+                    </a:lnL>
+                    <a:lnR cap="flat" cmpd="sng" w="9525">
+                      <a:solidFill>
+                        <a:srgbClr val="000000"/>
+                      </a:solidFill>
+                      <a:prstDash val="solid"/>
+                      <a:round/>
+                      <a:headEnd len="sm" w="sm" type="none"/>
+                      <a:tailEnd len="sm" w="sm" type="none"/>
+                    </a:lnR>
+                    <a:lnT cap="flat" cmpd="sng" w="9525">
+                      <a:solidFill>
+                        <a:srgbClr val="000000"/>
+                      </a:solidFill>
+                      <a:prstDash val="solid"/>
+                      <a:round/>
+                      <a:headEnd len="sm" w="sm" type="none"/>
+                      <a:tailEnd len="sm" w="sm" type="none"/>
+                    </a:lnT>
+                    <a:lnB cap="flat" cmpd="sng" w="9525">
+                      <a:solidFill>
+                        <a:srgbClr val="000000"/>
+                      </a:solidFill>
+                      <a:prstDash val="solid"/>
+                      <a:round/>
+                      <a:headEnd len="sm" w="sm" type="none"/>
+                      <a:tailEnd len="sm" w="sm" type="none"/>
+                    </a:lnB>
+                  </a:tcPr>
                 </a:tc>
               </a:tr>
               <a:tr h="146575">
@@ -23140,6 +23322,42 @@
                     </a:p>
                   </a:txBody>
                   <a:tcPr marT="0" marB="0" marR="34300" marL="34300">
+                    <a:lnL cap="flat" cmpd="sng" w="9525">
+                      <a:solidFill>
+                        <a:srgbClr val="000000"/>
+                      </a:solidFill>
+                      <a:prstDash val="solid"/>
+                      <a:round/>
+                      <a:headEnd len="sm" w="sm" type="none"/>
+                      <a:tailEnd len="sm" w="sm" type="none"/>
+                    </a:lnL>
+                    <a:lnR cap="flat" cmpd="sng" w="9525">
+                      <a:solidFill>
+                        <a:srgbClr val="000000"/>
+                      </a:solidFill>
+                      <a:prstDash val="solid"/>
+                      <a:round/>
+                      <a:headEnd len="sm" w="sm" type="none"/>
+                      <a:tailEnd len="sm" w="sm" type="none"/>
+                    </a:lnR>
+                    <a:lnT cap="flat" cmpd="sng" w="9525">
+                      <a:solidFill>
+                        <a:srgbClr val="000000"/>
+                      </a:solidFill>
+                      <a:prstDash val="solid"/>
+                      <a:round/>
+                      <a:headEnd len="sm" w="sm" type="none"/>
+                      <a:tailEnd len="sm" w="sm" type="none"/>
+                    </a:lnT>
+                    <a:lnB cap="flat" cmpd="sng" w="9525">
+                      <a:solidFill>
+                        <a:srgbClr val="000000"/>
+                      </a:solidFill>
+                      <a:prstDash val="solid"/>
+                      <a:round/>
+                      <a:headEnd len="sm" w="sm" type="none"/>
+                      <a:tailEnd len="sm" w="sm" type="none"/>
+                    </a:lnB>
                     <a:solidFill>
                       <a:srgbClr val="000000"/>
                     </a:solidFill>
@@ -23240,6 +23458,42 @@
                     </a:p>
                   </a:txBody>
                   <a:tcPr marT="0" marB="0" marR="34300" marL="34300">
+                    <a:lnL cap="flat" cmpd="sng" w="9525">
+                      <a:solidFill>
+                        <a:srgbClr val="000000"/>
+                      </a:solidFill>
+                      <a:prstDash val="solid"/>
+                      <a:round/>
+                      <a:headEnd len="sm" w="sm" type="none"/>
+                      <a:tailEnd len="sm" w="sm" type="none"/>
+                    </a:lnL>
+                    <a:lnR cap="flat" cmpd="sng" w="9525">
+                      <a:solidFill>
+                        <a:srgbClr val="000000"/>
+                      </a:solidFill>
+                      <a:prstDash val="solid"/>
+                      <a:round/>
+                      <a:headEnd len="sm" w="sm" type="none"/>
+                      <a:tailEnd len="sm" w="sm" type="none"/>
+                    </a:lnR>
+                    <a:lnT cap="flat" cmpd="sng" w="9525">
+                      <a:solidFill>
+                        <a:srgbClr val="000000"/>
+                      </a:solidFill>
+                      <a:prstDash val="solid"/>
+                      <a:round/>
+                      <a:headEnd len="sm" w="sm" type="none"/>
+                      <a:tailEnd len="sm" w="sm" type="none"/>
+                    </a:lnT>
+                    <a:lnB cap="flat" cmpd="sng" w="9525">
+                      <a:solidFill>
+                        <a:srgbClr val="000000"/>
+                      </a:solidFill>
+                      <a:prstDash val="solid"/>
+                      <a:round/>
+                      <a:headEnd len="sm" w="sm" type="none"/>
+                      <a:tailEnd len="sm" w="sm" type="none"/>
+                    </a:lnB>
                     <a:solidFill>
                       <a:srgbClr val="FFFFFF"/>
                     </a:solidFill>
@@ -23296,6 +23550,42 @@
                     </a:p>
                   </a:txBody>
                   <a:tcPr marT="0" marB="0" marR="34300" marL="34300">
+                    <a:lnL cap="flat" cmpd="sng" w="9525">
+                      <a:solidFill>
+                        <a:srgbClr val="000000"/>
+                      </a:solidFill>
+                      <a:prstDash val="solid"/>
+                      <a:round/>
+                      <a:headEnd len="sm" w="sm" type="none"/>
+                      <a:tailEnd len="sm" w="sm" type="none"/>
+                    </a:lnL>
+                    <a:lnR cap="flat" cmpd="sng" w="9525">
+                      <a:solidFill>
+                        <a:srgbClr val="000000"/>
+                      </a:solidFill>
+                      <a:prstDash val="solid"/>
+                      <a:round/>
+                      <a:headEnd len="sm" w="sm" type="none"/>
+                      <a:tailEnd len="sm" w="sm" type="none"/>
+                    </a:lnR>
+                    <a:lnT cap="flat" cmpd="sng" w="9525">
+                      <a:solidFill>
+                        <a:srgbClr val="000000"/>
+                      </a:solidFill>
+                      <a:prstDash val="solid"/>
+                      <a:round/>
+                      <a:headEnd len="sm" w="sm" type="none"/>
+                      <a:tailEnd len="sm" w="sm" type="none"/>
+                    </a:lnT>
+                    <a:lnB cap="flat" cmpd="sng" w="9525">
+                      <a:solidFill>
+                        <a:srgbClr val="000000"/>
+                      </a:solidFill>
+                      <a:prstDash val="solid"/>
+                      <a:round/>
+                      <a:headEnd len="sm" w="sm" type="none"/>
+                      <a:tailEnd len="sm" w="sm" type="none"/>
+                    </a:lnB>
                     <a:solidFill>
                       <a:srgbClr val="000000"/>
                     </a:solidFill>
@@ -23424,6 +23714,42 @@
                     </a:p>
                   </a:txBody>
                   <a:tcPr marT="0" marB="0" marR="34300" marL="34300">
+                    <a:lnL cap="flat" cmpd="sng" w="9525">
+                      <a:solidFill>
+                        <a:srgbClr val="000000"/>
+                      </a:solidFill>
+                      <a:prstDash val="solid"/>
+                      <a:round/>
+                      <a:headEnd len="sm" w="sm" type="none"/>
+                      <a:tailEnd len="sm" w="sm" type="none"/>
+                    </a:lnL>
+                    <a:lnR cap="flat" cmpd="sng" w="9525">
+                      <a:solidFill>
+                        <a:srgbClr val="000000"/>
+                      </a:solidFill>
+                      <a:prstDash val="solid"/>
+                      <a:round/>
+                      <a:headEnd len="sm" w="sm" type="none"/>
+                      <a:tailEnd len="sm" w="sm" type="none"/>
+                    </a:lnR>
+                    <a:lnT cap="flat" cmpd="sng" w="9525">
+                      <a:solidFill>
+                        <a:srgbClr val="000000"/>
+                      </a:solidFill>
+                      <a:prstDash val="solid"/>
+                      <a:round/>
+                      <a:headEnd len="sm" w="sm" type="none"/>
+                      <a:tailEnd len="sm" w="sm" type="none"/>
+                    </a:lnT>
+                    <a:lnB cap="flat" cmpd="sng" w="9525">
+                      <a:solidFill>
+                        <a:srgbClr val="000000"/>
+                      </a:solidFill>
+                      <a:prstDash val="solid"/>
+                      <a:round/>
+                      <a:headEnd len="sm" w="sm" type="none"/>
+                      <a:tailEnd len="sm" w="sm" type="none"/>
+                    </a:lnB>
                     <a:solidFill>
                       <a:srgbClr val="FFFFFF"/>
                     </a:solidFill>
@@ -23477,6 +23803,42 @@
                     </a:p>
                   </a:txBody>
                   <a:tcPr marT="0" marB="0" marR="34300" marL="34300">
+                    <a:lnL cap="flat" cmpd="sng" w="9525">
+                      <a:solidFill>
+                        <a:srgbClr val="000000"/>
+                      </a:solidFill>
+                      <a:prstDash val="solid"/>
+                      <a:round/>
+                      <a:headEnd len="sm" w="sm" type="none"/>
+                      <a:tailEnd len="sm" w="sm" type="none"/>
+                    </a:lnL>
+                    <a:lnR cap="flat" cmpd="sng" w="9525">
+                      <a:solidFill>
+                        <a:srgbClr val="000000"/>
+                      </a:solidFill>
+                      <a:prstDash val="solid"/>
+                      <a:round/>
+                      <a:headEnd len="sm" w="sm" type="none"/>
+                      <a:tailEnd len="sm" w="sm" type="none"/>
+                    </a:lnR>
+                    <a:lnT cap="flat" cmpd="sng" w="9525">
+                      <a:solidFill>
+                        <a:srgbClr val="000000"/>
+                      </a:solidFill>
+                      <a:prstDash val="solid"/>
+                      <a:round/>
+                      <a:headEnd len="sm" w="sm" type="none"/>
+                      <a:tailEnd len="sm" w="sm" type="none"/>
+                    </a:lnT>
+                    <a:lnB cap="flat" cmpd="sng" w="9525">
+                      <a:solidFill>
+                        <a:srgbClr val="000000"/>
+                      </a:solidFill>
+                      <a:prstDash val="solid"/>
+                      <a:round/>
+                      <a:headEnd len="sm" w="sm" type="none"/>
+                      <a:tailEnd len="sm" w="sm" type="none"/>
+                    </a:lnB>
                     <a:solidFill>
                       <a:srgbClr val="000000"/>
                     </a:solidFill>
@@ -23617,6 +23979,42 @@
                     </a:p>
                   </a:txBody>
                   <a:tcPr marT="0" marB="0" marR="34300" marL="34300">
+                    <a:lnL cap="flat" cmpd="sng" w="9525">
+                      <a:solidFill>
+                        <a:srgbClr val="000000"/>
+                      </a:solidFill>
+                      <a:prstDash val="solid"/>
+                      <a:round/>
+                      <a:headEnd len="sm" w="sm" type="none"/>
+                      <a:tailEnd len="sm" w="sm" type="none"/>
+                    </a:lnL>
+                    <a:lnR cap="flat" cmpd="sng" w="9525">
+                      <a:solidFill>
+                        <a:srgbClr val="000000"/>
+                      </a:solidFill>
+                      <a:prstDash val="solid"/>
+                      <a:round/>
+                      <a:headEnd len="sm" w="sm" type="none"/>
+                      <a:tailEnd len="sm" w="sm" type="none"/>
+                    </a:lnR>
+                    <a:lnT cap="flat" cmpd="sng" w="9525">
+                      <a:solidFill>
+                        <a:srgbClr val="000000"/>
+                      </a:solidFill>
+                      <a:prstDash val="solid"/>
+                      <a:round/>
+                      <a:headEnd len="sm" w="sm" type="none"/>
+                      <a:tailEnd len="sm" w="sm" type="none"/>
+                    </a:lnT>
+                    <a:lnB cap="flat" cmpd="sng" w="9525">
+                      <a:solidFill>
+                        <a:srgbClr val="000000"/>
+                      </a:solidFill>
+                      <a:prstDash val="solid"/>
+                      <a:round/>
+                      <a:headEnd len="sm" w="sm" type="none"/>
+                      <a:tailEnd len="sm" w="sm" type="none"/>
+                    </a:lnB>
                     <a:solidFill>
                       <a:srgbClr val="FFFFFF"/>
                     </a:solidFill>
@@ -23673,6 +24071,42 @@
                     </a:p>
                   </a:txBody>
                   <a:tcPr marT="0" marB="0" marR="34300" marL="34300">
+                    <a:lnL cap="flat" cmpd="sng" w="9525">
+                      <a:solidFill>
+                        <a:srgbClr val="000000"/>
+                      </a:solidFill>
+                      <a:prstDash val="solid"/>
+                      <a:round/>
+                      <a:headEnd len="sm" w="sm" type="none"/>
+                      <a:tailEnd len="sm" w="sm" type="none"/>
+                    </a:lnL>
+                    <a:lnR cap="flat" cmpd="sng" w="9525">
+                      <a:solidFill>
+                        <a:srgbClr val="000000"/>
+                      </a:solidFill>
+                      <a:prstDash val="solid"/>
+                      <a:round/>
+                      <a:headEnd len="sm" w="sm" type="none"/>
+                      <a:tailEnd len="sm" w="sm" type="none"/>
+                    </a:lnR>
+                    <a:lnT cap="flat" cmpd="sng" w="9525">
+                      <a:solidFill>
+                        <a:srgbClr val="000000"/>
+                      </a:solidFill>
+                      <a:prstDash val="solid"/>
+                      <a:round/>
+                      <a:headEnd len="sm" w="sm" type="none"/>
+                      <a:tailEnd len="sm" w="sm" type="none"/>
+                    </a:lnT>
+                    <a:lnB cap="flat" cmpd="sng" w="9525">
+                      <a:solidFill>
+                        <a:srgbClr val="000000"/>
+                      </a:solidFill>
+                      <a:prstDash val="solid"/>
+                      <a:round/>
+                      <a:headEnd len="sm" w="sm" type="none"/>
+                      <a:tailEnd len="sm" w="sm" type="none"/>
+                    </a:lnB>
                     <a:solidFill>
                       <a:srgbClr val="000000"/>
                     </a:solidFill>
@@ -23773,6 +24207,42 @@
                     </a:p>
                   </a:txBody>
                   <a:tcPr marT="0" marB="0" marR="34300" marL="34300">
+                    <a:lnL cap="flat" cmpd="sng" w="9525">
+                      <a:solidFill>
+                        <a:srgbClr val="000000"/>
+                      </a:solidFill>
+                      <a:prstDash val="solid"/>
+                      <a:round/>
+                      <a:headEnd len="sm" w="sm" type="none"/>
+                      <a:tailEnd len="sm" w="sm" type="none"/>
+                    </a:lnL>
+                    <a:lnR cap="flat" cmpd="sng" w="9525">
+                      <a:solidFill>
+                        <a:srgbClr val="000000"/>
+                      </a:solidFill>
+                      <a:prstDash val="solid"/>
+                      <a:round/>
+                      <a:headEnd len="sm" w="sm" type="none"/>
+                      <a:tailEnd len="sm" w="sm" type="none"/>
+                    </a:lnR>
+                    <a:lnT cap="flat" cmpd="sng" w="9525">
+                      <a:solidFill>
+                        <a:srgbClr val="000000"/>
+                      </a:solidFill>
+                      <a:prstDash val="solid"/>
+                      <a:round/>
+                      <a:headEnd len="sm" w="sm" type="none"/>
+                      <a:tailEnd len="sm" w="sm" type="none"/>
+                    </a:lnT>
+                    <a:lnB cap="flat" cmpd="sng" w="9525">
+                      <a:solidFill>
+                        <a:srgbClr val="000000"/>
+                      </a:solidFill>
+                      <a:prstDash val="solid"/>
+                      <a:round/>
+                      <a:headEnd len="sm" w="sm" type="none"/>
+                      <a:tailEnd len="sm" w="sm" type="none"/>
+                    </a:lnB>
                     <a:solidFill>
                       <a:srgbClr val="FFFFFF"/>
                     </a:solidFill>
@@ -23829,6 +24299,42 @@
                     </a:p>
                   </a:txBody>
                   <a:tcPr marT="0" marB="0" marR="34300" marL="34300">
+                    <a:lnL cap="flat" cmpd="sng" w="9525">
+                      <a:solidFill>
+                        <a:srgbClr val="000000"/>
+                      </a:solidFill>
+                      <a:prstDash val="solid"/>
+                      <a:round/>
+                      <a:headEnd len="sm" w="sm" type="none"/>
+                      <a:tailEnd len="sm" w="sm" type="none"/>
+                    </a:lnL>
+                    <a:lnR cap="flat" cmpd="sng" w="9525">
+                      <a:solidFill>
+                        <a:srgbClr val="000000"/>
+                      </a:solidFill>
+                      <a:prstDash val="solid"/>
+                      <a:round/>
+                      <a:headEnd len="sm" w="sm" type="none"/>
+                      <a:tailEnd len="sm" w="sm" type="none"/>
+                    </a:lnR>
+                    <a:lnT cap="flat" cmpd="sng" w="9525">
+                      <a:solidFill>
+                        <a:srgbClr val="000000"/>
+                      </a:solidFill>
+                      <a:prstDash val="solid"/>
+                      <a:round/>
+                      <a:headEnd len="sm" w="sm" type="none"/>
+                      <a:tailEnd len="sm" w="sm" type="none"/>
+                    </a:lnT>
+                    <a:lnB cap="flat" cmpd="sng" w="9525">
+                      <a:solidFill>
+                        <a:srgbClr val="000000"/>
+                      </a:solidFill>
+                      <a:prstDash val="solid"/>
+                      <a:round/>
+                      <a:headEnd len="sm" w="sm" type="none"/>
+                      <a:tailEnd len="sm" w="sm" type="none"/>
+                    </a:lnB>
                     <a:solidFill>
                       <a:srgbClr val="000000"/>
                     </a:solidFill>
@@ -23873,6 +24379,42 @@
                     </a:p>
                   </a:txBody>
                   <a:tcPr marT="0" marB="0" marR="34300" marL="34300">
+                    <a:lnL cap="flat" cmpd="sng" w="9525">
+                      <a:solidFill>
+                        <a:srgbClr val="000000"/>
+                      </a:solidFill>
+                      <a:prstDash val="solid"/>
+                      <a:round/>
+                      <a:headEnd len="sm" w="sm" type="none"/>
+                      <a:tailEnd len="sm" w="sm" type="none"/>
+                    </a:lnL>
+                    <a:lnR cap="flat" cmpd="sng" w="9525">
+                      <a:solidFill>
+                        <a:srgbClr val="000000"/>
+                      </a:solidFill>
+                      <a:prstDash val="solid"/>
+                      <a:round/>
+                      <a:headEnd len="sm" w="sm" type="none"/>
+                      <a:tailEnd len="sm" w="sm" type="none"/>
+                    </a:lnR>
+                    <a:lnT cap="flat" cmpd="sng" w="9525">
+                      <a:solidFill>
+                        <a:srgbClr val="000000"/>
+                      </a:solidFill>
+                      <a:prstDash val="solid"/>
+                      <a:round/>
+                      <a:headEnd len="sm" w="sm" type="none"/>
+                      <a:tailEnd len="sm" w="sm" type="none"/>
+                    </a:lnT>
+                    <a:lnB cap="flat" cmpd="sng" w="9525">
+                      <a:solidFill>
+                        <a:srgbClr val="000000"/>
+                      </a:solidFill>
+                      <a:prstDash val="solid"/>
+                      <a:round/>
+                      <a:headEnd len="sm" w="sm" type="none"/>
+                      <a:tailEnd len="sm" w="sm" type="none"/>
+                    </a:lnB>
                     <a:solidFill>
                       <a:srgbClr val="FFFFFF"/>
                     </a:solidFill>
@@ -24123,7 +24665,7 @@
         </p:nvSpPr>
         <p:spPr>
           <a:xfrm rot="-5400000">
-            <a:off x="-187607" y="348829"/>
+            <a:off x="-187607" y="653629"/>
             <a:ext cx="1679700" cy="362100"/>
           </a:xfrm>
           <a:prstGeom prst="rect">
@@ -25407,8 +25949,8 @@
         </p:nvSpPr>
         <p:spPr>
           <a:xfrm>
-            <a:off x="1878975" y="842024"/>
-            <a:ext cx="5679000" cy="1910100"/>
+            <a:off x="1878975" y="1008475"/>
+            <a:ext cx="5679000" cy="1743600"/>
           </a:xfrm>
           <a:prstGeom prst="wedgeRoundRectCallout">
             <a:avLst>
@@ -26374,8 +26916,8 @@
         </p:nvSpPr>
         <p:spPr>
           <a:xfrm>
-            <a:off x="4510650" y="197681"/>
-            <a:ext cx="3047400" cy="309600"/>
+            <a:off x="4510650" y="197675"/>
+            <a:ext cx="3158700" cy="309600"/>
           </a:xfrm>
           <a:prstGeom prst="rect">
             <a:avLst/>
@@ -33142,7 +33684,7 @@
         </p:nvSpPr>
         <p:spPr>
           <a:xfrm>
-            <a:off x="2602631" y="507281"/>
+            <a:off x="2602631" y="583481"/>
             <a:ext cx="1131000" cy="309600"/>
           </a:xfrm>
           <a:prstGeom prst="rect">
@@ -33200,7 +33742,7 @@
         </p:nvSpPr>
         <p:spPr>
           <a:xfrm>
-            <a:off x="5339794" y="507281"/>
+            <a:off x="5339794" y="583481"/>
             <a:ext cx="1131000" cy="309600"/>
           </a:xfrm>
           <a:prstGeom prst="rect">
@@ -33889,8 +34431,8 @@
         </p:nvSpPr>
         <p:spPr>
           <a:xfrm>
-            <a:off x="1310269" y="507206"/>
-            <a:ext cx="6498600" cy="4323300"/>
+            <a:off x="1373025" y="568750"/>
+            <a:ext cx="6435900" cy="4446000"/>
           </a:xfrm>
           <a:prstGeom prst="rect">
             <a:avLst/>
@@ -34041,7 +34583,7 @@
             <a:tbl>
               <a:tblPr>
                 <a:noFill/>
-                <a:tableStyleId>{ED616B15-95E1-4954-9011-6A7DC331E654}</a:tableStyleId>
+                <a:tableStyleId>{BFA29A32-B0D0-49FA-B40B-847DCE5264A0}</a:tableStyleId>
               </a:tblPr>
               <a:tblGrid>
                 <a:gridCol w="1325550"/>

</xml_diff>